<commit_message>
add notes for Printer support
</commit_message>
<xml_diff>
--- a/Removable Storage Access Control Samples/Demo/Intune CSP - Removable Storage Access Control Management Demo.pptx
+++ b/Removable Storage Access Control Samples/Demo/Intune CSP - Removable Storage Access Control Management Demo.pptx
@@ -140,7 +140,7 @@
   <pc:docChgLst>
     <pc:chgData name="Tewang Chen (HENRY)" userId="e9721f04-100c-4083-a3db-e5d51ed68867" providerId="ADAL" clId="{FDD3F037-175F-4C8B-9B33-F36A7F0293FD}"/>
     <pc:docChg chg="undo redo custSel addSld delSld modSld">
-      <pc:chgData name="Tewang Chen (HENRY)" userId="e9721f04-100c-4083-a3db-e5d51ed68867" providerId="ADAL" clId="{FDD3F037-175F-4C8B-9B33-F36A7F0293FD}" dt="2022-05-27T22:22:49.591" v="1304" actId="22"/>
+      <pc:chgData name="Tewang Chen (HENRY)" userId="e9721f04-100c-4083-a3db-e5d51ed68867" providerId="ADAL" clId="{FDD3F037-175F-4C8B-9B33-F36A7F0293FD}" dt="2022-06-28T18:52:26.750" v="1506" actId="14100"/>
       <pc:docMkLst>
         <pc:docMk/>
       </pc:docMkLst>
@@ -341,11 +341,19 @@
         </pc:graphicFrameChg>
       </pc:sldChg>
       <pc:sldChg chg="addSp delSp modSp add mod">
-        <pc:chgData name="Tewang Chen (HENRY)" userId="e9721f04-100c-4083-a3db-e5d51ed68867" providerId="ADAL" clId="{FDD3F037-175F-4C8B-9B33-F36A7F0293FD}" dt="2022-04-12T04:43:37.696" v="937" actId="14100"/>
+        <pc:chgData name="Tewang Chen (HENRY)" userId="e9721f04-100c-4083-a3db-e5d51ed68867" providerId="ADAL" clId="{FDD3F037-175F-4C8B-9B33-F36A7F0293FD}" dt="2022-06-28T18:52:26.750" v="1506" actId="14100"/>
         <pc:sldMkLst>
           <pc:docMk/>
           <pc:sldMk cId="2930490233" sldId="2076138584"/>
         </pc:sldMkLst>
+        <pc:spChg chg="add mod">
+          <ac:chgData name="Tewang Chen (HENRY)" userId="e9721f04-100c-4083-a3db-e5d51ed68867" providerId="ADAL" clId="{FDD3F037-175F-4C8B-9B33-F36A7F0293FD}" dt="2022-06-28T18:52:26.750" v="1506" actId="14100"/>
+          <ac:spMkLst>
+            <pc:docMk/>
+            <pc:sldMk cId="2930490233" sldId="2076138584"/>
+            <ac:spMk id="2" creationId="{85C830E2-B387-849B-CF83-EEC59129301A}"/>
+          </ac:spMkLst>
+        </pc:spChg>
         <pc:spChg chg="mod">
           <ac:chgData name="Tewang Chen (HENRY)" userId="e9721f04-100c-4083-a3db-e5d51ed68867" providerId="ADAL" clId="{FDD3F037-175F-4C8B-9B33-F36A7F0293FD}" dt="2022-04-12T04:43:30.647" v="935" actId="1076"/>
           <ac:spMkLst>
@@ -811,7 +819,7 @@
           <a:p>
             <a:fld id="{32F2D6AF-A23B-40B7-9E74-BB80C816C37B}" type="datetimeFigureOut">
               <a:rPr lang="en-US" smtClean="0"/>
-              <a:t>5/27/2022</a:t>
+              <a:t>6/28/2022</a:t>
             </a:fld>
             <a:endParaRPr lang="en-US"/>
           </a:p>
@@ -2161,7 +2169,7 @@
           <a:p>
             <a:fld id="{1BD27626-8FF0-4907-AD58-B991DE6781AA}" type="datetimeFigureOut">
               <a:rPr lang="en-US" smtClean="0"/>
-              <a:t>5/27/2022</a:t>
+              <a:t>6/28/2022</a:t>
             </a:fld>
             <a:endParaRPr lang="en-US"/>
           </a:p>
@@ -2359,7 +2367,7 @@
           <a:p>
             <a:fld id="{1BD27626-8FF0-4907-AD58-B991DE6781AA}" type="datetimeFigureOut">
               <a:rPr lang="en-US" smtClean="0"/>
-              <a:t>5/27/2022</a:t>
+              <a:t>6/28/2022</a:t>
             </a:fld>
             <a:endParaRPr lang="en-US"/>
           </a:p>
@@ -2567,7 +2575,7 @@
           <a:p>
             <a:fld id="{1BD27626-8FF0-4907-AD58-B991DE6781AA}" type="datetimeFigureOut">
               <a:rPr lang="en-US" smtClean="0"/>
-              <a:t>5/27/2022</a:t>
+              <a:t>6/28/2022</a:t>
             </a:fld>
             <a:endParaRPr lang="en-US"/>
           </a:p>
@@ -2838,7 +2846,7 @@
           <a:p>
             <a:fld id="{1BD27626-8FF0-4907-AD58-B991DE6781AA}" type="datetimeFigureOut">
               <a:rPr lang="en-US" smtClean="0"/>
-              <a:t>5/27/2022</a:t>
+              <a:t>6/28/2022</a:t>
             </a:fld>
             <a:endParaRPr lang="en-US"/>
           </a:p>
@@ -3113,7 +3121,7 @@
           <a:p>
             <a:fld id="{1BD27626-8FF0-4907-AD58-B991DE6781AA}" type="datetimeFigureOut">
               <a:rPr lang="en-US" smtClean="0"/>
-              <a:t>5/27/2022</a:t>
+              <a:t>6/28/2022</a:t>
             </a:fld>
             <a:endParaRPr lang="en-US"/>
           </a:p>
@@ -3378,7 +3386,7 @@
           <a:p>
             <a:fld id="{1BD27626-8FF0-4907-AD58-B991DE6781AA}" type="datetimeFigureOut">
               <a:rPr lang="en-US" smtClean="0"/>
-              <a:t>5/27/2022</a:t>
+              <a:t>6/28/2022</a:t>
             </a:fld>
             <a:endParaRPr lang="en-US"/>
           </a:p>
@@ -3790,7 +3798,7 @@
           <a:p>
             <a:fld id="{1BD27626-8FF0-4907-AD58-B991DE6781AA}" type="datetimeFigureOut">
               <a:rPr lang="en-US" smtClean="0"/>
-              <a:t>5/27/2022</a:t>
+              <a:t>6/28/2022</a:t>
             </a:fld>
             <a:endParaRPr lang="en-US"/>
           </a:p>
@@ -3931,7 +3939,7 @@
           <a:p>
             <a:fld id="{1BD27626-8FF0-4907-AD58-B991DE6781AA}" type="datetimeFigureOut">
               <a:rPr lang="en-US" smtClean="0"/>
-              <a:t>5/27/2022</a:t>
+              <a:t>6/28/2022</a:t>
             </a:fld>
             <a:endParaRPr lang="en-US"/>
           </a:p>
@@ -4044,7 +4052,7 @@
           <a:p>
             <a:fld id="{1BD27626-8FF0-4907-AD58-B991DE6781AA}" type="datetimeFigureOut">
               <a:rPr lang="en-US" smtClean="0"/>
-              <a:t>5/27/2022</a:t>
+              <a:t>6/28/2022</a:t>
             </a:fld>
             <a:endParaRPr lang="en-US"/>
           </a:p>
@@ -4355,7 +4363,7 @@
           <a:p>
             <a:fld id="{1BD27626-8FF0-4907-AD58-B991DE6781AA}" type="datetimeFigureOut">
               <a:rPr lang="en-US" smtClean="0"/>
-              <a:t>5/27/2022</a:t>
+              <a:t>6/28/2022</a:t>
             </a:fld>
             <a:endParaRPr lang="en-US"/>
           </a:p>
@@ -4643,7 +4651,7 @@
           <a:p>
             <a:fld id="{1BD27626-8FF0-4907-AD58-B991DE6781AA}" type="datetimeFigureOut">
               <a:rPr lang="en-US" smtClean="0"/>
-              <a:t>5/27/2022</a:t>
+              <a:t>6/28/2022</a:t>
             </a:fld>
             <a:endParaRPr lang="en-US"/>
           </a:p>
@@ -4884,7 +4892,7 @@
           <a:p>
             <a:fld id="{1BD27626-8FF0-4907-AD58-B991DE6781AA}" type="datetimeFigureOut">
               <a:rPr lang="en-US" smtClean="0"/>
-              <a:t>5/27/2022</a:t>
+              <a:t>6/28/2022</a:t>
             </a:fld>
             <a:endParaRPr lang="en-US"/>
           </a:p>
@@ -6626,6 +6634,55 @@
           </a:prstGeom>
         </p:spPr>
       </p:pic>
+      <p:sp>
+        <p:nvSpPr>
+          <p:cNvPr id="2" name="Rectangle 1">
+            <a:extLst>
+              <a:ext uri="{FF2B5EF4-FFF2-40B4-BE49-F238E27FC236}">
+                <a16:creationId xmlns:a16="http://schemas.microsoft.com/office/drawing/2014/main" id="{85C830E2-B387-849B-CF83-EEC59129301A}"/>
+              </a:ext>
+            </a:extLst>
+          </p:cNvPr>
+          <p:cNvSpPr/>
+          <p:nvPr/>
+        </p:nvSpPr>
+        <p:spPr>
+          <a:xfrm>
+            <a:off x="409302" y="5094514"/>
+            <a:ext cx="3762103" cy="1392997"/>
+          </a:xfrm>
+          <a:prstGeom prst="rect">
+            <a:avLst/>
+          </a:prstGeom>
+        </p:spPr>
+        <p:style>
+          <a:lnRef idx="2">
+            <a:schemeClr val="accent1">
+              <a:shade val="50000"/>
+            </a:schemeClr>
+          </a:lnRef>
+          <a:fillRef idx="1">
+            <a:schemeClr val="accent1"/>
+          </a:fillRef>
+          <a:effectRef idx="0">
+            <a:schemeClr val="accent1"/>
+          </a:effectRef>
+          <a:fontRef idx="minor">
+            <a:schemeClr val="lt1"/>
+          </a:fontRef>
+        </p:style>
+        <p:txBody>
+          <a:bodyPr rtlCol="0" anchor="ctr"/>
+          <a:lstStyle/>
+          <a:p>
+            <a:pPr algn="ctr"/>
+            <a:r>
+              <a:rPr lang="en-US" dirty="0"/>
+              <a:t>Recently we expanded our feature to Printer as well, so please make sure Allow Printer if you only want to manage removable storage.</a:t>
+            </a:r>
+          </a:p>
+        </p:txBody>
+      </p:sp>
     </p:spTree>
     <p:extLst>
       <p:ext uri="{BB962C8B-B14F-4D97-AF65-F5344CB8AC3E}">
@@ -11988,6 +12045,25 @@
 </file>
 
 <file path=customXml/item1.xml><?xml version="1.0" encoding="utf-8"?>
+<?mso-contentType ?>
+<FormTemplates xmlns="http://schemas.microsoft.com/sharepoint/v3/contenttype/forms">
+  <Display>DocumentLibraryForm</Display>
+  <Edit>DocumentLibraryForm</Edit>
+  <New>DocumentLibraryForm</New>
+</FormTemplates>
+</file>
+
+<file path=customXml/item2.xml><?xml version="1.0" encoding="utf-8"?>
+<p:properties xmlns:p="http://schemas.microsoft.com/office/2006/metadata/properties" xmlns:xsi="http://www.w3.org/2001/XMLSchema-instance" xmlns:pc="http://schemas.microsoft.com/office/infopath/2007/PartnerControls">
+  <documentManagement>
+    <MediaServiceKeyPoints xmlns="aad11946-4c9c-4040-b563-8e1b612b28b6" xsi:nil="true"/>
+    <_ip_UnifiedCompliancePolicyUIAction xmlns="http://schemas.microsoft.com/sharepoint/v3" xsi:nil="true"/>
+    <_ip_UnifiedCompliancePolicyProperties xmlns="http://schemas.microsoft.com/sharepoint/v3" xsi:nil="true"/>
+  </documentManagement>
+</p:properties>
+</file>
+
+<file path=customXml/item3.xml><?xml version="1.0" encoding="utf-8"?>
 <ct:contentTypeSchema xmlns:ct="http://schemas.microsoft.com/office/2006/metadata/contentType" xmlns:ma="http://schemas.microsoft.com/office/2006/metadata/properties/metaAttributes" ct:_="" ma:_="" ma:contentTypeName="Document" ma:contentTypeID="0x010100F2E3C9F8D8836348BE0ED9B20B9E8E4E" ma:contentTypeVersion="17" ma:contentTypeDescription="Create a new document." ma:contentTypeScope="" ma:versionID="98f0f2b92ed15ae503ff0e5fd03c5f2a">
   <xsd:schema xmlns:xsd="http://www.w3.org/2001/XMLSchema" xmlns:xs="http://www.w3.org/2001/XMLSchema" xmlns:p="http://schemas.microsoft.com/office/2006/metadata/properties" xmlns:ns1="http://schemas.microsoft.com/sharepoint/v3" xmlns:ns2="da08d7dc-04c9-4a4a-814a-c32a0938420f" xmlns:ns3="aad11946-4c9c-4040-b563-8e1b612b28b6" targetNamespace="http://schemas.microsoft.com/office/2006/metadata/properties" ma:root="true" ma:fieldsID="8c861534b6e49b57b65abdd52a22307f" ns1:_="" ns2:_="" ns3:_="">
     <xsd:import namespace="http://schemas.microsoft.com/sharepoint/v3"/>
@@ -12241,41 +12317,10 @@
 </ct:contentTypeSchema>
 </file>
 
-<file path=customXml/item2.xml><?xml version="1.0" encoding="utf-8"?>
-<p:properties xmlns:p="http://schemas.microsoft.com/office/2006/metadata/properties" xmlns:xsi="http://www.w3.org/2001/XMLSchema-instance" xmlns:pc="http://schemas.microsoft.com/office/infopath/2007/PartnerControls">
-  <documentManagement>
-    <MediaServiceKeyPoints xmlns="aad11946-4c9c-4040-b563-8e1b612b28b6" xsi:nil="true"/>
-    <_ip_UnifiedCompliancePolicyUIAction xmlns="http://schemas.microsoft.com/sharepoint/v3" xsi:nil="true"/>
-    <_ip_UnifiedCompliancePolicyProperties xmlns="http://schemas.microsoft.com/sharepoint/v3" xsi:nil="true"/>
-  </documentManagement>
-</p:properties>
-</file>
-
-<file path=customXml/item3.xml><?xml version="1.0" encoding="utf-8"?>
-<?mso-contentType ?>
-<FormTemplates xmlns="http://schemas.microsoft.com/sharepoint/v3/contenttype/forms">
-  <Display>DocumentLibraryForm</Display>
-  <Edit>DocumentLibraryForm</Edit>
-  <New>DocumentLibraryForm</New>
-</FormTemplates>
-</file>
-
 <file path=customXml/itemProps1.xml><?xml version="1.0" encoding="utf-8"?>
-<ds:datastoreItem xmlns:ds="http://schemas.openxmlformats.org/officeDocument/2006/customXml" ds:itemID="{C223B579-8E02-40AF-8FE0-49D0A1B49B79}">
+<ds:datastoreItem xmlns:ds="http://schemas.openxmlformats.org/officeDocument/2006/customXml" ds:itemID="{3229ECDF-A2A2-4ED6-8500-3707E8B96A4A}">
   <ds:schemaRefs>
-    <ds:schemaRef ds:uri="aad11946-4c9c-4040-b563-8e1b612b28b6"/>
-    <ds:schemaRef ds:uri="da08d7dc-04c9-4a4a-814a-c32a0938420f"/>
-    <ds:schemaRef ds:uri="http://purl.org/dc/elements/1.1/"/>
-    <ds:schemaRef ds:uri="http://purl.org/dc/terms/"/>
-    <ds:schemaRef ds:uri="http://schemas.microsoft.com/internal/obd"/>
-    <ds:schemaRef ds:uri="http://schemas.microsoft.com/office/2006/documentManagement/types"/>
-    <ds:schemaRef ds:uri="http://schemas.microsoft.com/office/2006/metadata/contentType"/>
-    <ds:schemaRef ds:uri="http://schemas.microsoft.com/office/2006/metadata/properties"/>
-    <ds:schemaRef ds:uri="http://schemas.microsoft.com/office/2006/metadata/properties/metaAttributes"/>
-    <ds:schemaRef ds:uri="http://schemas.microsoft.com/office/infopath/2007/PartnerControls"/>
-    <ds:schemaRef ds:uri="http://schemas.microsoft.com/sharepoint/v3"/>
-    <ds:schemaRef ds:uri="http://schemas.openxmlformats.org/package/2006/metadata/core-properties"/>
-    <ds:schemaRef ds:uri="http://www.w3.org/2001/XMLSchema"/>
+    <ds:schemaRef ds:uri="http://schemas.microsoft.com/sharepoint/v3/contenttype/forms"/>
   </ds:schemaRefs>
 </ds:datastoreItem>
 </file>
@@ -12299,9 +12344,21 @@
 </file>
 
 <file path=customXml/itemProps3.xml><?xml version="1.0" encoding="utf-8"?>
-<ds:datastoreItem xmlns:ds="http://schemas.openxmlformats.org/officeDocument/2006/customXml" ds:itemID="{3229ECDF-A2A2-4ED6-8500-3707E8B96A4A}">
+<ds:datastoreItem xmlns:ds="http://schemas.openxmlformats.org/officeDocument/2006/customXml" ds:itemID="{C223B579-8E02-40AF-8FE0-49D0A1B49B79}">
   <ds:schemaRefs>
-    <ds:schemaRef ds:uri="http://schemas.microsoft.com/sharepoint/v3/contenttype/forms"/>
+    <ds:schemaRef ds:uri="aad11946-4c9c-4040-b563-8e1b612b28b6"/>
+    <ds:schemaRef ds:uri="da08d7dc-04c9-4a4a-814a-c32a0938420f"/>
+    <ds:schemaRef ds:uri="http://purl.org/dc/elements/1.1/"/>
+    <ds:schemaRef ds:uri="http://purl.org/dc/terms/"/>
+    <ds:schemaRef ds:uri="http://schemas.microsoft.com/internal/obd"/>
+    <ds:schemaRef ds:uri="http://schemas.microsoft.com/office/2006/documentManagement/types"/>
+    <ds:schemaRef ds:uri="http://schemas.microsoft.com/office/2006/metadata/contentType"/>
+    <ds:schemaRef ds:uri="http://schemas.microsoft.com/office/2006/metadata/properties"/>
+    <ds:schemaRef ds:uri="http://schemas.microsoft.com/office/2006/metadata/properties/metaAttributes"/>
+    <ds:schemaRef ds:uri="http://schemas.microsoft.com/office/infopath/2007/PartnerControls"/>
+    <ds:schemaRef ds:uri="http://schemas.microsoft.com/sharepoint/v3"/>
+    <ds:schemaRef ds:uri="http://schemas.openxmlformats.org/package/2006/metadata/core-properties"/>
+    <ds:schemaRef ds:uri="http://www.w3.org/2001/XMLSchema"/>
   </ds:schemaRefs>
 </ds:datastoreItem>
 </file>

</xml_diff>